<commit_message>
ERS: Pushing the final presentation.
</commit_message>
<xml_diff>
--- a/Presentation.pptx
+++ b/Presentation.pptx
@@ -5,7 +5,7 @@
     <p:sldMasterId id="2147483897" r:id="rId1"/>
   </p:sldMasterIdLst>
   <p:notesMasterIdLst>
-    <p:notesMasterId r:id="rId15"/>
+    <p:notesMasterId r:id="rId14"/>
   </p:notesMasterIdLst>
   <p:sldIdLst>
     <p:sldId id="296" r:id="rId2"/>
@@ -18,9 +18,8 @@
     <p:sldId id="297" r:id="rId9"/>
     <p:sldId id="300" r:id="rId10"/>
     <p:sldId id="298" r:id="rId11"/>
-    <p:sldId id="299" r:id="rId12"/>
-    <p:sldId id="274" r:id="rId13"/>
-    <p:sldId id="275" r:id="rId14"/>
+    <p:sldId id="274" r:id="rId12"/>
+    <p:sldId id="275" r:id="rId13"/>
   </p:sldIdLst>
   <p:sldSz cx="12192000" cy="6858000"/>
   <p:notesSz cx="6858000" cy="9144000"/>
@@ -209,7 +208,7 @@
           <a:p>
             <a:fld id="{218C8F45-0D35-4F06-9AC8-C547C595EDF0}" type="datetimeFigureOut">
               <a:rPr lang="en-US" smtClean="0"/>
-              <a:t>9/14/2023</a:t>
+              <a:t>9/18/2023</a:t>
             </a:fld>
             <a:endParaRPr lang="en-US"/>
           </a:p>
@@ -609,8 +608,50 @@
           <a:p>
             <a:r>
               <a:rPr lang="en-US" dirty="0"/>
-              <a:t>Kyle presents</a:t>
-            </a:r>
+              <a:t>Kyle to present</a:t>
+            </a:r>
+          </a:p>
+          <a:p>
+            <a:endParaRPr lang="en-US" dirty="0"/>
+          </a:p>
+          <a:p>
+            <a:r>
+              <a:rPr lang="en-US" dirty="0"/>
+              <a:t>PACR = </a:t>
+            </a:r>
+            <a:br>
+              <a:rPr lang="en-US" dirty="0">
+                <a:effectLst/>
+              </a:rPr>
+            </a:br>
+            <a:r>
+              <a:rPr lang="en-US" dirty="0">
+                <a:effectLst/>
+              </a:rPr>
+              <a:t>Passing (yards) Air (yards) Conversion Ratio - the number of passing yards per air yards thrown per game</a:t>
+            </a:r>
+          </a:p>
+          <a:p>
+            <a:endParaRPr lang="en-US" dirty="0"/>
+          </a:p>
+          <a:p>
+            <a:r>
+              <a:rPr lang="en-US" dirty="0"/>
+              <a:t>EPA = assigned to quarter back, value added by the offence on a play.</a:t>
+            </a:r>
+          </a:p>
+          <a:p>
+            <a:r>
+              <a:rPr lang="en-US" dirty="0"/>
+              <a:t>Rushing EPA = </a:t>
+            </a:r>
+            <a:r>
+              <a:rPr lang="en-US" dirty="0">
+                <a:effectLst/>
+              </a:rPr>
+              <a:t>Expected points added on rush attempts (incl. scrambles and kneel downs).</a:t>
+            </a:r>
+            <a:endParaRPr lang="en-US" dirty="0"/>
           </a:p>
         </p:txBody>
       </p:sp>
@@ -629,7 +670,7 @@
           <a:bodyPr/>
           <a:lstStyle/>
           <a:p>
-            <a:fld id="{34523330-130C-4A11-8249-F3612B4CD402}" type="slidenum">
+            <a:fld id="{F1D59B1D-B0BC-4C10-A0E9-E068C37A006F}" type="slidenum">
               <a:rPr lang="en-US" smtClean="0"/>
               <a:t>11</a:t>
             </a:fld>
@@ -640,7 +681,7 @@
     </p:spTree>
     <p:extLst>
       <p:ext uri="{BB962C8B-B14F-4D97-AF65-F5344CB8AC3E}">
-        <p14:creationId xmlns:p14="http://schemas.microsoft.com/office/powerpoint/2010/main" val="2276449186"/>
+        <p14:creationId xmlns:p14="http://schemas.microsoft.com/office/powerpoint/2010/main" val="3080591106"/>
       </p:ext>
     </p:extLst>
   </p:cSld>
@@ -694,10 +735,7 @@
           <a:bodyPr/>
           <a:lstStyle/>
           <a:p>
-            <a:r>
-              <a:rPr lang="en-US" dirty="0"/>
-              <a:t>Kyle to present</a:t>
-            </a:r>
+            <a:endParaRPr lang="en-US" dirty="0"/>
           </a:p>
         </p:txBody>
       </p:sp>
@@ -716,93 +754,9 @@
           <a:bodyPr/>
           <a:lstStyle/>
           <a:p>
-            <a:fld id="{F1D59B1D-B0BC-4C10-A0E9-E068C37A006F}" type="slidenum">
+            <a:fld id="{34523330-130C-4A11-8249-F3612B4CD402}" type="slidenum">
               <a:rPr lang="en-US" smtClean="0"/>
               <a:t>12</a:t>
-            </a:fld>
-            <a:endParaRPr lang="en-US"/>
-          </a:p>
-        </p:txBody>
-      </p:sp>
-    </p:spTree>
-    <p:extLst>
-      <p:ext uri="{BB962C8B-B14F-4D97-AF65-F5344CB8AC3E}">
-        <p14:creationId xmlns:p14="http://schemas.microsoft.com/office/powerpoint/2010/main" val="3080591106"/>
-      </p:ext>
-    </p:extLst>
-  </p:cSld>
-  <p:clrMapOvr>
-    <a:masterClrMapping/>
-  </p:clrMapOvr>
-</p:notes>
-</file>
-
-<file path=ppt/notesSlides/notesSlide12.xml><?xml version="1.0" encoding="utf-8"?>
-<p:notes xmlns:a="http://schemas.openxmlformats.org/drawingml/2006/main" xmlns:r="http://schemas.openxmlformats.org/officeDocument/2006/relationships" xmlns:p="http://schemas.openxmlformats.org/presentationml/2006/main">
-  <p:cSld>
-    <p:spTree>
-      <p:nvGrpSpPr>
-        <p:cNvPr id="1" name=""/>
-        <p:cNvGrpSpPr/>
-        <p:nvPr/>
-      </p:nvGrpSpPr>
-      <p:grpSpPr>
-        <a:xfrm>
-          <a:off x="0" y="0"/>
-          <a:ext cx="0" cy="0"/>
-          <a:chOff x="0" y="0"/>
-          <a:chExt cx="0" cy="0"/>
-        </a:xfrm>
-      </p:grpSpPr>
-      <p:sp>
-        <p:nvSpPr>
-          <p:cNvPr id="2" name="Slide Image Placeholder 1"/>
-          <p:cNvSpPr>
-            <a:spLocks noGrp="1" noRot="1" noChangeAspect="1"/>
-          </p:cNvSpPr>
-          <p:nvPr>
-            <p:ph type="sldImg"/>
-          </p:nvPr>
-        </p:nvSpPr>
-        <p:spPr/>
-      </p:sp>
-      <p:sp>
-        <p:nvSpPr>
-          <p:cNvPr id="3" name="Notes Placeholder 2"/>
-          <p:cNvSpPr>
-            <a:spLocks noGrp="1"/>
-          </p:cNvSpPr>
-          <p:nvPr>
-            <p:ph type="body" idx="1"/>
-          </p:nvPr>
-        </p:nvSpPr>
-        <p:spPr/>
-        <p:txBody>
-          <a:bodyPr/>
-          <a:lstStyle/>
-          <a:p>
-            <a:endParaRPr lang="en-US" dirty="0"/>
-          </a:p>
-        </p:txBody>
-      </p:sp>
-      <p:sp>
-        <p:nvSpPr>
-          <p:cNvPr id="4" name="Slide Number Placeholder 3"/>
-          <p:cNvSpPr>
-            <a:spLocks noGrp="1"/>
-          </p:cNvSpPr>
-          <p:nvPr>
-            <p:ph type="sldNum" sz="quarter" idx="5"/>
-          </p:nvPr>
-        </p:nvSpPr>
-        <p:spPr/>
-        <p:txBody>
-          <a:bodyPr/>
-          <a:lstStyle/>
-          <a:p>
-            <a:fld id="{34523330-130C-4A11-8249-F3612B4CD402}" type="slidenum">
-              <a:rPr lang="en-US" smtClean="0"/>
-              <a:t>13</a:t>
             </a:fld>
             <a:endParaRPr lang="en-US"/>
           </a:p>
@@ -1467,6 +1421,12 @@
             <a:r>
               <a:rPr lang="en-US" dirty="0"/>
               <a:t>Timothy presents</a:t>
+            </a:r>
+          </a:p>
+          <a:p>
+            <a:r>
+              <a:rPr lang="en-US" dirty="0"/>
+              <a:t>Unsupervised Learning, predicted vs. actual</a:t>
             </a:r>
           </a:p>
         </p:txBody>
@@ -1820,7 +1780,7 @@
           <a:p>
             <a:fld id="{EDD99DFF-4D7C-4671-8EF0-23A72D1484EC}" type="datetimeFigureOut">
               <a:rPr lang="en-US" smtClean="0"/>
-              <a:t>9/14/2023</a:t>
+              <a:t>9/18/2023</a:t>
             </a:fld>
             <a:endParaRPr lang="en-US"/>
           </a:p>
@@ -2028,7 +1988,7 @@
           <a:p>
             <a:fld id="{EDD99DFF-4D7C-4671-8EF0-23A72D1484EC}" type="datetimeFigureOut">
               <a:rPr lang="en-US" smtClean="0"/>
-              <a:t>9/14/2023</a:t>
+              <a:t>9/18/2023</a:t>
             </a:fld>
             <a:endParaRPr lang="en-US"/>
           </a:p>
@@ -2284,7 +2244,7 @@
           <a:p>
             <a:fld id="{EDD99DFF-4D7C-4671-8EF0-23A72D1484EC}" type="datetimeFigureOut">
               <a:rPr lang="en-US" smtClean="0"/>
-              <a:t>9/14/2023</a:t>
+              <a:t>9/18/2023</a:t>
             </a:fld>
             <a:endParaRPr lang="en-US"/>
           </a:p>
@@ -2459,7 +2419,7 @@
           <a:p>
             <a:fld id="{EDD99DFF-4D7C-4671-8EF0-23A72D1484EC}" type="datetimeFigureOut">
               <a:rPr lang="en-US" smtClean="0"/>
-              <a:t>9/14/2023</a:t>
+              <a:t>9/18/2023</a:t>
             </a:fld>
             <a:endParaRPr lang="en-US"/>
           </a:p>
@@ -2629,7 +2589,7 @@
           <a:p>
             <a:fld id="{EDD99DFF-4D7C-4671-8EF0-23A72D1484EC}" type="datetimeFigureOut">
               <a:rPr lang="en-US" smtClean="0"/>
-              <a:t>9/14/2023</a:t>
+              <a:t>9/18/2023</a:t>
             </a:fld>
             <a:endParaRPr lang="en-US"/>
           </a:p>
@@ -2972,7 +2932,7 @@
           <a:p>
             <a:fld id="{EDD99DFF-4D7C-4671-8EF0-23A72D1484EC}" type="datetimeFigureOut">
               <a:rPr lang="en-US" smtClean="0"/>
-              <a:t>9/14/2023</a:t>
+              <a:t>9/18/2023</a:t>
             </a:fld>
             <a:endParaRPr lang="en-US"/>
           </a:p>
@@ -3247,7 +3207,7 @@
           <a:p>
             <a:fld id="{EDD99DFF-4D7C-4671-8EF0-23A72D1484EC}" type="datetimeFigureOut">
               <a:rPr lang="en-US" smtClean="0"/>
-              <a:t>9/14/2023</a:t>
+              <a:t>9/18/2023</a:t>
             </a:fld>
             <a:endParaRPr lang="en-US"/>
           </a:p>
@@ -3626,7 +3586,7 @@
           <a:p>
             <a:fld id="{EDD99DFF-4D7C-4671-8EF0-23A72D1484EC}" type="datetimeFigureOut">
               <a:rPr lang="en-US" smtClean="0"/>
-              <a:t>9/14/2023</a:t>
+              <a:t>9/18/2023</a:t>
             </a:fld>
             <a:endParaRPr lang="en-US"/>
           </a:p>
@@ -3744,7 +3704,7 @@
           <a:p>
             <a:fld id="{EDD99DFF-4D7C-4671-8EF0-23A72D1484EC}" type="datetimeFigureOut">
               <a:rPr lang="en-US" smtClean="0"/>
-              <a:t>9/14/2023</a:t>
+              <a:t>9/18/2023</a:t>
             </a:fld>
             <a:endParaRPr lang="en-US"/>
           </a:p>
@@ -3915,7 +3875,7 @@
           <a:p>
             <a:fld id="{EDD99DFF-4D7C-4671-8EF0-23A72D1484EC}" type="datetimeFigureOut">
               <a:rPr lang="en-US" smtClean="0"/>
-              <a:t>9/14/2023</a:t>
+              <a:t>9/18/2023</a:t>
             </a:fld>
             <a:endParaRPr lang="en-US"/>
           </a:p>
@@ -4269,7 +4229,7 @@
           <a:p>
             <a:fld id="{EDD99DFF-4D7C-4671-8EF0-23A72D1484EC}" type="datetimeFigureOut">
               <a:rPr lang="en-US" smtClean="0"/>
-              <a:t>9/14/2023</a:t>
+              <a:t>9/18/2023</a:t>
             </a:fld>
             <a:endParaRPr lang="en-US"/>
           </a:p>
@@ -4646,7 +4606,7 @@
           <a:p>
             <a:fld id="{EDD99DFF-4D7C-4671-8EF0-23A72D1484EC}" type="datetimeFigureOut">
               <a:rPr lang="en-US" smtClean="0"/>
-              <a:t>9/14/2023</a:t>
+              <a:t>9/18/2023</a:t>
             </a:fld>
             <a:endParaRPr lang="en-US"/>
           </a:p>
@@ -4933,7 +4893,7 @@
           <a:p>
             <a:fld id="{EDD99DFF-4D7C-4671-8EF0-23A72D1484EC}" type="datetimeFigureOut">
               <a:rPr lang="en-US" smtClean="0"/>
-              <a:t>9/14/2023</a:t>
+              <a:t>9/18/2023</a:t>
             </a:fld>
             <a:endParaRPr lang="en-US"/>
           </a:p>
@@ -5673,7 +5633,12 @@
             <p:ph type="title"/>
           </p:nvPr>
         </p:nvSpPr>
-        <p:spPr/>
+        <p:spPr>
+          <a:xfrm>
+            <a:off x="1066800" y="141514"/>
+            <a:ext cx="10058400" cy="670560"/>
+          </a:xfrm>
+        </p:spPr>
         <p:txBody>
           <a:bodyPr>
             <a:normAutofit/>
@@ -5705,8 +5670,8 @@
         </p:nvSpPr>
         <p:spPr>
           <a:xfrm>
-            <a:off x="914400" y="1937657"/>
-            <a:ext cx="10363200" cy="3853543"/>
+            <a:off x="109430" y="5748288"/>
+            <a:ext cx="11832772" cy="466939"/>
           </a:xfrm>
         </p:spPr>
         <p:txBody>
@@ -5718,14 +5683,7 @@
             <a:pPr lvl="1"/>
             <a:r>
               <a:rPr lang="en-US" dirty="0"/>
-              <a:t>Scatter plot clustering of Actual vs Predicted player positions</a:t>
-            </a:r>
-          </a:p>
-          <a:p>
-            <a:pPr lvl="2"/>
-            <a:r>
-              <a:rPr lang="en-US" dirty="0"/>
-              <a:t>(Show both charts here)</a:t>
+              <a:t>High-level Radar charts of positional data in the analyzed datasets.</a:t>
             </a:r>
           </a:p>
           <a:p>
@@ -5735,41 +5693,47 @@
             <a:endParaRPr lang="en-US" dirty="0"/>
           </a:p>
           <a:p>
-            <a:pPr marL="384048" lvl="2" indent="0">
+            <a:pPr marL="201168" lvl="1" indent="0">
               <a:buNone/>
             </a:pPr>
             <a:endParaRPr lang="en-US" dirty="0"/>
           </a:p>
           <a:p>
-            <a:pPr marL="384048" lvl="2" indent="0">
-              <a:buNone/>
-            </a:pPr>
-            <a:endParaRPr lang="en-US" dirty="0"/>
-          </a:p>
-          <a:p>
-            <a:pPr lvl="1"/>
-            <a:r>
-              <a:rPr lang="en-US" dirty="0"/>
-              <a:t>Circle Diagram review of stat trends by position</a:t>
-            </a:r>
-          </a:p>
-          <a:p>
-            <a:pPr lvl="2"/>
-            <a:r>
-              <a:rPr lang="en-US" dirty="0"/>
-              <a:t>(Show diagrams here or on next pages</a:t>
-            </a:r>
-          </a:p>
-          <a:p>
             <a:pPr lvl="1"/>
             <a:endParaRPr lang="en-US" dirty="0"/>
           </a:p>
-          <a:p>
-            <a:pPr lvl="1"/>
-            <a:endParaRPr lang="en-US" dirty="0"/>
-          </a:p>
-        </p:txBody>
-      </p:sp>
+        </p:txBody>
+      </p:sp>
+      <p:pic>
+        <p:nvPicPr>
+          <p:cNvPr id="4" name="Picture 3">
+            <a:extLst>
+              <a:ext uri="{FF2B5EF4-FFF2-40B4-BE49-F238E27FC236}">
+                <a16:creationId xmlns:a16="http://schemas.microsoft.com/office/drawing/2014/main" id="{108E2CC9-4FBB-BDCA-571C-A4C4A7E8C795}"/>
+              </a:ext>
+            </a:extLst>
+          </p:cNvPr>
+          <p:cNvPicPr>
+            <a:picLocks noChangeAspect="1"/>
+          </p:cNvPicPr>
+          <p:nvPr/>
+        </p:nvPicPr>
+        <p:blipFill>
+          <a:blip r:embed="rId3"/>
+          <a:stretch>
+            <a:fillRect/>
+          </a:stretch>
+        </p:blipFill>
+        <p:spPr>
+          <a:xfrm>
+            <a:off x="0" y="1293336"/>
+            <a:ext cx="12192000" cy="3839337"/>
+          </a:xfrm>
+          <a:prstGeom prst="rect">
+            <a:avLst/>
+          </a:prstGeom>
+        </p:spPr>
+      </p:pic>
     </p:spTree>
     <p:extLst>
       <p:ext uri="{BB962C8B-B14F-4D97-AF65-F5344CB8AC3E}">
@@ -5802,112 +5766,6 @@
       </p:grpSpPr>
       <p:sp>
         <p:nvSpPr>
-          <p:cNvPr id="6" name="Title 5">
-            <a:extLst>
-              <a:ext uri="{FF2B5EF4-FFF2-40B4-BE49-F238E27FC236}">
-                <a16:creationId xmlns:a16="http://schemas.microsoft.com/office/drawing/2014/main" id="{3435514F-098A-5E0B-B259-D04424AF5714}"/>
-              </a:ext>
-            </a:extLst>
-          </p:cNvPr>
-          <p:cNvSpPr>
-            <a:spLocks noGrp="1"/>
-          </p:cNvSpPr>
-          <p:nvPr>
-            <p:ph type="title"/>
-          </p:nvPr>
-        </p:nvSpPr>
-        <p:spPr/>
-        <p:txBody>
-          <a:bodyPr>
-            <a:normAutofit/>
-          </a:bodyPr>
-          <a:lstStyle/>
-          <a:p>
-            <a:r>
-              <a:rPr lang="en-US" sz="4000" cap="none" dirty="0"/>
-              <a:t>Clustering Analysis Visuals: </a:t>
-            </a:r>
-          </a:p>
-        </p:txBody>
-      </p:sp>
-      <p:sp>
-        <p:nvSpPr>
-          <p:cNvPr id="2" name="Content Placeholder 2">
-            <a:extLst>
-              <a:ext uri="{FF2B5EF4-FFF2-40B4-BE49-F238E27FC236}">
-                <a16:creationId xmlns:a16="http://schemas.microsoft.com/office/drawing/2014/main" id="{90DE78EF-856F-9E9B-48FE-CEEC6D33BF0A}"/>
-              </a:ext>
-            </a:extLst>
-          </p:cNvPr>
-          <p:cNvSpPr>
-            <a:spLocks noGrp="1"/>
-          </p:cNvSpPr>
-          <p:nvPr>
-            <p:ph sz="quarter" idx="13"/>
-          </p:nvPr>
-        </p:nvSpPr>
-        <p:spPr>
-          <a:xfrm>
-            <a:off x="914400" y="1937657"/>
-            <a:ext cx="10363200" cy="3853543"/>
-          </a:xfrm>
-        </p:spPr>
-        <p:txBody>
-          <a:bodyPr anchor="t">
-            <a:normAutofit/>
-          </a:bodyPr>
-          <a:lstStyle/>
-          <a:p>
-            <a:pPr marL="201168" lvl="1" indent="0">
-              <a:buNone/>
-            </a:pPr>
-            <a:r>
-              <a:rPr lang="en-US" sz="2800" b="1" dirty="0">
-                <a:solidFill>
-                  <a:srgbClr val="FF0000"/>
-                </a:solidFill>
-              </a:rPr>
-              <a:t>Circle diagrams or scatter plots here.</a:t>
-            </a:r>
-          </a:p>
-          <a:p>
-            <a:pPr lvl="1"/>
-            <a:endParaRPr lang="en-US" dirty="0"/>
-          </a:p>
-        </p:txBody>
-      </p:sp>
-    </p:spTree>
-    <p:extLst>
-      <p:ext uri="{BB962C8B-B14F-4D97-AF65-F5344CB8AC3E}">
-        <p14:creationId xmlns:p14="http://schemas.microsoft.com/office/powerpoint/2010/main" val="1078195250"/>
-      </p:ext>
-    </p:extLst>
-  </p:cSld>
-  <p:clrMapOvr>
-    <a:masterClrMapping/>
-  </p:clrMapOvr>
-</p:sld>
-</file>
-
-<file path=ppt/slides/slide12.xml><?xml version="1.0" encoding="utf-8"?>
-<p:sld xmlns:a="http://schemas.openxmlformats.org/drawingml/2006/main" xmlns:r="http://schemas.openxmlformats.org/officeDocument/2006/relationships" xmlns:p="http://schemas.openxmlformats.org/presentationml/2006/main">
-  <p:cSld>
-    <p:spTree>
-      <p:nvGrpSpPr>
-        <p:cNvPr id="1" name=""/>
-        <p:cNvGrpSpPr/>
-        <p:nvPr/>
-      </p:nvGrpSpPr>
-      <p:grpSpPr>
-        <a:xfrm>
-          <a:off x="0" y="0"/>
-          <a:ext cx="0" cy="0"/>
-          <a:chOff x="0" y="0"/>
-          <a:chExt cx="0" cy="0"/>
-        </a:xfrm>
-      </p:grpSpPr>
-      <p:sp>
-        <p:nvSpPr>
           <p:cNvPr id="2" name="Title 1">
             <a:extLst>
               <a:ext uri="{FF2B5EF4-FFF2-40B4-BE49-F238E27FC236}">
@@ -5952,7 +5810,12 @@
             <p:ph idx="1"/>
           </p:nvPr>
         </p:nvSpPr>
-        <p:spPr/>
+        <p:spPr>
+          <a:xfrm>
+            <a:off x="1097280" y="1845734"/>
+            <a:ext cx="7444740" cy="4023360"/>
+          </a:xfrm>
+        </p:spPr>
         <p:txBody>
           <a:bodyPr>
             <a:normAutofit/>
@@ -5969,15 +5832,19 @@
             <a:r>
               <a:rPr lang="en-US" dirty="0">
                 <a:solidFill>
-                  <a:srgbClr val="FF0000"/>
+                  <a:schemeClr val="tx1"/>
                 </a:solidFill>
               </a:rPr>
-              <a:t>Contrast performance of both models. </a:t>
+              <a:t>Improvement from 88% to 99% with additional yearly data and new classification method.</a:t>
             </a:r>
           </a:p>
           <a:p>
             <a:pPr lvl="1"/>
-            <a:endParaRPr lang="en-US" dirty="0"/>
+            <a:endParaRPr lang="en-US" dirty="0">
+              <a:solidFill>
+                <a:schemeClr val="tx1"/>
+              </a:solidFill>
+            </a:endParaRPr>
           </a:p>
           <a:p>
             <a:r>
@@ -5989,30 +5856,20 @@
             <a:pPr lvl="1"/>
             <a:r>
               <a:rPr lang="en-US" dirty="0"/>
-              <a:t>Most significant indicators of position were stat lines: </a:t>
-            </a:r>
-            <a:r>
-              <a:rPr lang="en-US" dirty="0">
-                <a:solidFill>
-                  <a:srgbClr val="FF0000"/>
-                </a:solidFill>
-              </a:rPr>
-              <a:t>XYZ</a:t>
+              <a:t>Most significant indicators of position were stat lines: passing EPA, PACR, rushing EPA.</a:t>
             </a:r>
           </a:p>
           <a:p>
             <a:pPr lvl="1"/>
             <a:r>
-              <a:rPr lang="en-US" dirty="0">
-                <a:solidFill>
-                  <a:srgbClr val="FF0000"/>
-                </a:solidFill>
-              </a:rPr>
-              <a:t>Contrast Actual vs Predicted scatter plots.</a:t>
-            </a:r>
-          </a:p>
-          <a:p>
-            <a:pPr lvl="1"/>
+              <a:rPr lang="en-US" dirty="0"/>
+              <a:t>Future iterations to drop additional columns.</a:t>
+            </a:r>
+          </a:p>
+          <a:p>
+            <a:pPr marL="201168" lvl="1" indent="0">
+              <a:buNone/>
+            </a:pPr>
             <a:endParaRPr lang="en-US" dirty="0">
               <a:solidFill>
                 <a:srgbClr val="FF0000"/>
@@ -6020,100 +5877,55 @@
             </a:endParaRPr>
           </a:p>
           <a:p>
+            <a:r>
+              <a:rPr lang="en-US" dirty="0"/>
+              <a:t>Stat trends per position:</a:t>
+            </a:r>
+          </a:p>
+          <a:p>
             <a:pPr lvl="1"/>
-            <a:endParaRPr lang="en-US" dirty="0">
-              <a:solidFill>
-                <a:srgbClr val="FF0000"/>
-              </a:solidFill>
-            </a:endParaRPr>
-          </a:p>
-          <a:p>
             <a:r>
               <a:rPr lang="en-US" dirty="0"/>
-              <a:t>Unsupervised Clustering and Stat trends per position:</a:t>
-            </a:r>
-          </a:p>
-          <a:p>
-            <a:pPr lvl="1"/>
-            <a:r>
-              <a:rPr lang="en-US" dirty="0">
-                <a:solidFill>
-                  <a:srgbClr val="FF0000"/>
-                </a:solidFill>
-              </a:rPr>
-              <a:t>Kyle talking points here for conclusions</a:t>
-            </a:r>
-          </a:p>
-        </p:txBody>
-      </p:sp>
-      <p:sp>
-        <p:nvSpPr>
-          <p:cNvPr id="6" name="TextBox 5">
+              <a:t>Radar charts showed that Running back position most ambiguous for Fantasy Football relevant stats.</a:t>
+            </a:r>
+          </a:p>
+        </p:txBody>
+      </p:sp>
+      <p:pic>
+        <p:nvPicPr>
+          <p:cNvPr id="5" name="Picture 4">
             <a:extLst>
               <a:ext uri="{FF2B5EF4-FFF2-40B4-BE49-F238E27FC236}">
-                <a16:creationId xmlns:a16="http://schemas.microsoft.com/office/drawing/2014/main" id="{55B8DCA6-8C42-002D-1E3C-A5EA17B96C4E}"/>
+                <a16:creationId xmlns:a16="http://schemas.microsoft.com/office/drawing/2014/main" id="{2C93DBEC-BB57-0F5F-C3FC-56DADD065799}"/>
               </a:ext>
             </a:extLst>
           </p:cNvPr>
-          <p:cNvSpPr txBox="1"/>
+          <p:cNvPicPr>
+            <a:picLocks noChangeAspect="1"/>
+          </p:cNvPicPr>
           <p:nvPr/>
-        </p:nvSpPr>
+        </p:nvPicPr>
+        <p:blipFill>
+          <a:blip r:embed="rId3"/>
+          <a:stretch>
+            <a:fillRect/>
+          </a:stretch>
+        </p:blipFill>
         <p:spPr>
           <a:xfrm>
-            <a:off x="0" y="6295676"/>
-            <a:ext cx="11897032" cy="577081"/>
+            <a:off x="8615681" y="3638440"/>
+            <a:ext cx="3457206" cy="2498558"/>
           </a:xfrm>
           <a:prstGeom prst="rect">
             <a:avLst/>
           </a:prstGeom>
-          <a:noFill/>
+          <a:ln>
+            <a:solidFill>
+              <a:schemeClr val="tx1"/>
+            </a:solidFill>
+          </a:ln>
         </p:spPr>
-        <p:txBody>
-          <a:bodyPr wrap="square">
-            <a:spAutoFit/>
-          </a:bodyPr>
-          <a:lstStyle/>
-          <a:p>
-            <a:r>
-              <a:rPr lang="en-US" sz="1050" dirty="0"/>
-              <a:t>Centers for Disease Control and Prevention. (April 25, 2023). West Nile Virus: Clinical Laboratory Evaluation. Retrieved from </a:t>
-            </a:r>
-            <a:r>
-              <a:rPr lang="en-US" sz="1050" dirty="0">
-                <a:hlinkClick r:id="rId3"/>
-              </a:rPr>
-              <a:t>https://www.cdc.gov/westnile/healthcareproviders/healthCareProviders-ClinLabEval.html</a:t>
-            </a:r>
-            <a:endParaRPr lang="en-US" sz="1050" dirty="0"/>
-          </a:p>
-          <a:p>
-            <a:r>
-              <a:rPr lang="en-US" sz="1050" dirty="0"/>
-              <a:t>Centers for Disease Control and Prevention. (November 15, 2022). Lyme Disease: Surveillance Frequently Asked Questions (FAQs). Retrieved from </a:t>
-            </a:r>
-            <a:r>
-              <a:rPr lang="en-US" sz="1050" dirty="0">
-                <a:hlinkClick r:id="rId4"/>
-              </a:rPr>
-              <a:t>https://www.cdc.gov/lyme/stats/survfaq.html</a:t>
-            </a:r>
-            <a:endParaRPr lang="en-US" sz="1050" dirty="0"/>
-          </a:p>
-          <a:p>
-            <a:r>
-              <a:rPr lang="en-US" sz="1050" dirty="0"/>
-              <a:t>Centers for Disease Control and Prevention. (April 4, 2023.). West Nile Virus: Surveillance Resources. Retrieved from </a:t>
-            </a:r>
-            <a:r>
-              <a:rPr lang="en-US" sz="1050" dirty="0">
-                <a:hlinkClick r:id="rId5"/>
-              </a:rPr>
-              <a:t>https://www.cdc.gov/westnile/resourcepages/survResources.html</a:t>
-            </a:r>
-            <a:endParaRPr lang="en-US" sz="1050" dirty="0"/>
-          </a:p>
-        </p:txBody>
-      </p:sp>
+      </p:pic>
     </p:spTree>
     <p:extLst>
       <p:ext uri="{BB962C8B-B14F-4D97-AF65-F5344CB8AC3E}">
@@ -6127,7 +5939,7 @@
 </p:sld>
 </file>
 
-<file path=ppt/slides/slide13.xml><?xml version="1.0" encoding="utf-8"?>
+<file path=ppt/slides/slide12.xml><?xml version="1.0" encoding="utf-8"?>
 <p:sld xmlns:a="http://schemas.openxmlformats.org/drawingml/2006/main" xmlns:r="http://schemas.openxmlformats.org/officeDocument/2006/relationships" xmlns:p="http://schemas.openxmlformats.org/presentationml/2006/main">
   <p:cSld>
     <p:spTree>
@@ -6265,7 +6077,7 @@
           <a:p>
             <a:r>
               <a:rPr lang="en-US" cap="none" dirty="0"/>
-              <a:t>Kyle Murphy, Timothy Salazar,  Travis, Steinkopf, Evan Sprecher</a:t>
+              <a:t>Kyle Murphy, Timothy Salazar, Travis, Steinkopf, Evan Sprecher</a:t>
             </a:r>
           </a:p>
         </p:txBody>
@@ -6459,7 +6271,7 @@
           <p:nvPr>
             <p:extLst>
               <p:ext uri="{D42A27DB-BD31-4B8C-83A1-F6EECF244321}">
-                <p14:modId xmlns:p14="http://schemas.microsoft.com/office/powerpoint/2010/main" val="691575307"/>
+                <p14:modId xmlns:p14="http://schemas.microsoft.com/office/powerpoint/2010/main" val="1581787842"/>
               </p:ext>
             </p:extLst>
           </p:nvPr>
@@ -6693,7 +6505,7 @@
                     <a:p>
                       <a:r>
                         <a:rPr lang="en-US" dirty="0"/>
-                        <a:t>2007 – 2022</a:t>
+                        <a:t>2013 – 2022</a:t>
                       </a:r>
                     </a:p>
                   </a:txBody>
@@ -6706,7 +6518,7 @@
                     <a:p>
                       <a:r>
                         <a:rPr lang="en-US" dirty="0"/>
-                        <a:t>15</a:t>
+                        <a:t>10</a:t>
                       </a:r>
                     </a:p>
                   </a:txBody>
@@ -6756,7 +6568,7 @@
                       </a:pPr>
                       <a:r>
                         <a:rPr lang="en-US" dirty="0"/>
-                        <a:t>2007 – 2022</a:t>
+                        <a:t>2013 – 2022</a:t>
                       </a:r>
                     </a:p>
                   </a:txBody>
@@ -6769,7 +6581,7 @@
                     <a:p>
                       <a:r>
                         <a:rPr lang="en-US" dirty="0"/>
-                        <a:t>15</a:t>
+                        <a:t>10</a:t>
                       </a:r>
                     </a:p>
                   </a:txBody>
@@ -6802,7 +6614,7 @@
                     <a:p>
                       <a:r>
                         <a:rPr lang="en-US" dirty="0"/>
-                        <a:t>2007 – 2022</a:t>
+                        <a:t>2013 – 2022</a:t>
                       </a:r>
                     </a:p>
                   </a:txBody>
@@ -6815,7 +6627,7 @@
                     <a:p>
                       <a:r>
                         <a:rPr lang="en-US" dirty="0"/>
-                        <a:t>15</a:t>
+                        <a:t>10</a:t>
                       </a:r>
                     </a:p>
                   </a:txBody>
@@ -7292,7 +7104,7 @@
                   <a:srgbClr val="000000"/>
                 </a:solidFill>
               </a:rPr>
-              <a:t>Past 15 years: 2007 - 2022</a:t>
+              <a:t>Past 10 years: 2013 - 2022</a:t>
             </a:r>
             <a:endParaRPr lang="en-US" b="0" i="0" dirty="0">
               <a:solidFill>
@@ -7324,10 +7136,10 @@
       </p:sp>
       <p:pic>
         <p:nvPicPr>
-          <p:cNvPr id="5" name="Picture 4">
+          <p:cNvPr id="7" name="Picture 6">
             <a:extLst>
               <a:ext uri="{FF2B5EF4-FFF2-40B4-BE49-F238E27FC236}">
-                <a16:creationId xmlns:a16="http://schemas.microsoft.com/office/drawing/2014/main" id="{7541DB45-6DC7-A2C4-32D6-0DDBAA0115C4}"/>
+                <a16:creationId xmlns:a16="http://schemas.microsoft.com/office/drawing/2014/main" id="{B82E96E6-60ED-2E4A-7481-7A8CB73F1F8A}"/>
               </a:ext>
             </a:extLst>
           </p:cNvPr>
@@ -7344,8 +7156,8 @@
         </p:blipFill>
         <p:spPr>
           <a:xfrm>
-            <a:off x="5105471" y="5819354"/>
-            <a:ext cx="6176865" cy="841105"/>
+            <a:off x="6432884" y="5200514"/>
+            <a:ext cx="5515726" cy="1025046"/>
           </a:xfrm>
           <a:prstGeom prst="rect">
             <a:avLst/>
@@ -7354,10 +7166,10 @@
       </p:pic>
       <p:pic>
         <p:nvPicPr>
-          <p:cNvPr id="9" name="Picture 8">
+          <p:cNvPr id="10" name="Picture 9">
             <a:extLst>
               <a:ext uri="{FF2B5EF4-FFF2-40B4-BE49-F238E27FC236}">
-                <a16:creationId xmlns:a16="http://schemas.microsoft.com/office/drawing/2014/main" id="{C5A34980-B1E4-4E2B-8CCD-AB96BCBD2F5C}"/>
+                <a16:creationId xmlns:a16="http://schemas.microsoft.com/office/drawing/2014/main" id="{F833CA78-BFCB-57B4-29D6-32DCCEAEE793}"/>
               </a:ext>
             </a:extLst>
           </p:cNvPr>
@@ -7374,17 +7186,12 @@
         </p:blipFill>
         <p:spPr>
           <a:xfrm>
-            <a:off x="8000294" y="635330"/>
-            <a:ext cx="2857500" cy="619125"/>
+            <a:off x="7485772" y="1991158"/>
+            <a:ext cx="3409950" cy="600075"/>
           </a:xfrm>
           <a:prstGeom prst="rect">
             <a:avLst/>
           </a:prstGeom>
-          <a:solidFill>
-            <a:schemeClr val="accent1">
-              <a:lumMod val="50000"/>
-            </a:schemeClr>
-          </a:solidFill>
         </p:spPr>
       </p:pic>
     </p:spTree>
@@ -7494,12 +7301,8 @@
           <a:p>
             <a:pPr lvl="1"/>
             <a:r>
-              <a:rPr lang="en-US" dirty="0">
-                <a:solidFill>
-                  <a:srgbClr val="FF0000"/>
-                </a:solidFill>
-              </a:rPr>
-              <a:t>Talking point</a:t>
+              <a:rPr lang="en-US" dirty="0"/>
+              <a:t>Initial model for baseline of optimization – Logistic Regression Classifier</a:t>
             </a:r>
           </a:p>
           <a:p>
@@ -7507,184 +7310,103 @@
             <a:endParaRPr lang="en-US" dirty="0"/>
           </a:p>
           <a:p>
-            <a:pPr lvl="1"/>
+            <a:pPr marL="201168" lvl="1" indent="0">
+              <a:buNone/>
+            </a:pPr>
             <a:endParaRPr lang="en-US" dirty="0"/>
           </a:p>
-          <a:p>
-            <a:pPr lvl="1"/>
-            <a:endParaRPr lang="en-US" dirty="0"/>
-          </a:p>
-          <a:p>
-            <a:pPr lvl="1"/>
-            <a:endParaRPr lang="en-US" dirty="0"/>
-          </a:p>
-          <a:p>
-            <a:pPr lvl="1"/>
-            <a:r>
-              <a:rPr lang="en-US" dirty="0"/>
-              <a:t>(Example snippets of code for easy explanation of methods)</a:t>
-            </a:r>
-          </a:p>
-        </p:txBody>
-      </p:sp>
-      <p:grpSp>
-        <p:nvGrpSpPr>
-          <p:cNvPr id="10" name="Group 9">
+        </p:txBody>
+      </p:sp>
+      <p:pic>
+        <p:nvPicPr>
+          <p:cNvPr id="11" name="Picture 10">
             <a:extLst>
               <a:ext uri="{FF2B5EF4-FFF2-40B4-BE49-F238E27FC236}">
-                <a16:creationId xmlns:a16="http://schemas.microsoft.com/office/drawing/2014/main" id="{41C590EE-460D-C6DA-F61B-DB440A3E3FB3}"/>
+                <a16:creationId xmlns:a16="http://schemas.microsoft.com/office/drawing/2014/main" id="{D2701478-6ECF-8393-0A1A-2E9F0B27F770}"/>
               </a:ext>
             </a:extLst>
           </p:cNvPr>
-          <p:cNvGrpSpPr/>
+          <p:cNvPicPr>
+            <a:picLocks noChangeAspect="1"/>
+          </p:cNvPicPr>
           <p:nvPr/>
-        </p:nvGrpSpPr>
-        <p:grpSpPr>
+        </p:nvPicPr>
+        <p:blipFill>
+          <a:blip r:embed="rId3"/>
+          <a:stretch>
+            <a:fillRect/>
+          </a:stretch>
+        </p:blipFill>
+        <p:spPr>
           <a:xfrm>
-            <a:off x="773001" y="4920069"/>
-            <a:ext cx="10211419" cy="1659150"/>
-            <a:chOff x="762115" y="3703682"/>
-            <a:chExt cx="10211419" cy="1659150"/>
+            <a:off x="6285875" y="3553588"/>
+            <a:ext cx="5524500" cy="819150"/>
           </a:xfrm>
-        </p:grpSpPr>
-        <p:grpSp>
-          <p:nvGrpSpPr>
-            <p:cNvPr id="8" name="Group 7">
-              <a:extLst>
-                <a:ext uri="{FF2B5EF4-FFF2-40B4-BE49-F238E27FC236}">
-                  <a16:creationId xmlns:a16="http://schemas.microsoft.com/office/drawing/2014/main" id="{49449163-6F0F-E011-9A52-0B82B4647724}"/>
-                </a:ext>
-              </a:extLst>
-            </p:cNvPr>
-            <p:cNvGrpSpPr/>
-            <p:nvPr/>
-          </p:nvGrpSpPr>
-          <p:grpSpPr>
-            <a:xfrm>
-              <a:off x="762115" y="3703682"/>
-              <a:ext cx="5533683" cy="1659150"/>
-              <a:chOff x="784417" y="3429000"/>
-              <a:chExt cx="5533683" cy="1659150"/>
-            </a:xfrm>
-          </p:grpSpPr>
-          <p:pic>
-            <p:nvPicPr>
-              <p:cNvPr id="6" name="Picture 5">
-                <a:extLst>
-                  <a:ext uri="{FF2B5EF4-FFF2-40B4-BE49-F238E27FC236}">
-                    <a16:creationId xmlns:a16="http://schemas.microsoft.com/office/drawing/2014/main" id="{D32E0AC6-1652-1D83-5699-185354164849}"/>
-                  </a:ext>
-                </a:extLst>
-              </p:cNvPr>
-              <p:cNvPicPr>
-                <a:picLocks noChangeAspect="1"/>
-              </p:cNvPicPr>
-              <p:nvPr/>
-            </p:nvPicPr>
-            <p:blipFill>
-              <a:blip r:embed="rId3"/>
-              <a:stretch>
-                <a:fillRect/>
-              </a:stretch>
-            </p:blipFill>
-            <p:spPr>
-              <a:xfrm>
-                <a:off x="784417" y="3429000"/>
-                <a:ext cx="4024560" cy="1659150"/>
-              </a:xfrm>
-              <a:prstGeom prst="rect">
-                <a:avLst/>
-              </a:prstGeom>
-              <a:ln>
-                <a:solidFill>
-                  <a:schemeClr val="tx1"/>
-                </a:solidFill>
-              </a:ln>
-            </p:spPr>
-          </p:pic>
-          <p:sp>
-            <p:nvSpPr>
-              <p:cNvPr id="7" name="Arrow: Right 6">
-                <a:extLst>
-                  <a:ext uri="{FF2B5EF4-FFF2-40B4-BE49-F238E27FC236}">
-                    <a16:creationId xmlns:a16="http://schemas.microsoft.com/office/drawing/2014/main" id="{8FC11500-C053-777D-8999-3F01F500C3AB}"/>
-                  </a:ext>
-                </a:extLst>
-              </p:cNvPr>
-              <p:cNvSpPr/>
-              <p:nvPr/>
-            </p:nvSpPr>
-            <p:spPr>
-              <a:xfrm>
-                <a:off x="5225280" y="3963067"/>
-                <a:ext cx="1092820" cy="591015"/>
-              </a:xfrm>
-              <a:prstGeom prst="rightArrow">
-                <a:avLst/>
-              </a:prstGeom>
-              <a:ln>
-                <a:solidFill>
-                  <a:schemeClr val="tx1"/>
-                </a:solidFill>
-              </a:ln>
-            </p:spPr>
-            <p:style>
-              <a:lnRef idx="2">
-                <a:schemeClr val="accent1">
-                  <a:shade val="15000"/>
-                </a:schemeClr>
-              </a:lnRef>
-              <a:fillRef idx="1">
-                <a:schemeClr val="accent1"/>
-              </a:fillRef>
-              <a:effectRef idx="0">
-                <a:schemeClr val="accent1"/>
-              </a:effectRef>
-              <a:fontRef idx="minor">
-                <a:schemeClr val="lt1"/>
-              </a:fontRef>
-            </p:style>
-            <p:txBody>
-              <a:bodyPr rtlCol="0" anchor="ctr"/>
-              <a:lstStyle/>
-              <a:p>
-                <a:pPr algn="ctr"/>
-                <a:endParaRPr lang="en-US"/>
-              </a:p>
-            </p:txBody>
-          </p:sp>
-        </p:grpSp>
-        <p:pic>
-          <p:nvPicPr>
-            <p:cNvPr id="9" name="Picture 8">
-              <a:extLst>
-                <a:ext uri="{FF2B5EF4-FFF2-40B4-BE49-F238E27FC236}">
-                  <a16:creationId xmlns:a16="http://schemas.microsoft.com/office/drawing/2014/main" id="{9E126045-EC2F-003F-FA18-2710BB325648}"/>
-                </a:ext>
-              </a:extLst>
-            </p:cNvPr>
-            <p:cNvPicPr>
-              <a:picLocks noChangeAspect="1"/>
-            </p:cNvPicPr>
-            <p:nvPr/>
-          </p:nvPicPr>
-          <p:blipFill>
-            <a:blip r:embed="rId4"/>
-            <a:stretch>
-              <a:fillRect/>
-            </a:stretch>
-          </p:blipFill>
-          <p:spPr>
-            <a:xfrm>
-              <a:off x="6637351" y="3703682"/>
-              <a:ext cx="4336183" cy="1659150"/>
-            </a:xfrm>
-            <a:prstGeom prst="rect">
-              <a:avLst/>
-            </a:prstGeom>
-          </p:spPr>
-        </p:pic>
-      </p:grpSp>
+          <a:prstGeom prst="rect">
+            <a:avLst/>
+          </a:prstGeom>
+        </p:spPr>
+      </p:pic>
+      <p:pic>
+        <p:nvPicPr>
+          <p:cNvPr id="13" name="Picture 12">
+            <a:extLst>
+              <a:ext uri="{FF2B5EF4-FFF2-40B4-BE49-F238E27FC236}">
+                <a16:creationId xmlns:a16="http://schemas.microsoft.com/office/drawing/2014/main" id="{B1B315C1-A913-FAF5-9E27-7FC27F7F5CCE}"/>
+              </a:ext>
+            </a:extLst>
+          </p:cNvPr>
+          <p:cNvPicPr>
+            <a:picLocks noChangeAspect="1"/>
+          </p:cNvPicPr>
+          <p:nvPr/>
+        </p:nvPicPr>
+        <p:blipFill>
+          <a:blip r:embed="rId4"/>
+          <a:stretch>
+            <a:fillRect/>
+          </a:stretch>
+        </p:blipFill>
+        <p:spPr>
+          <a:xfrm>
+            <a:off x="6285875" y="4696877"/>
+            <a:ext cx="5667375" cy="1304925"/>
+          </a:xfrm>
+          <a:prstGeom prst="rect">
+            <a:avLst/>
+          </a:prstGeom>
+        </p:spPr>
+      </p:pic>
+      <p:pic>
+        <p:nvPicPr>
+          <p:cNvPr id="15" name="Picture 14">
+            <a:extLst>
+              <a:ext uri="{FF2B5EF4-FFF2-40B4-BE49-F238E27FC236}">
+                <a16:creationId xmlns:a16="http://schemas.microsoft.com/office/drawing/2014/main" id="{E7F23563-2CB8-B285-47E3-E1F99BE09C0C}"/>
+              </a:ext>
+            </a:extLst>
+          </p:cNvPr>
+          <p:cNvPicPr>
+            <a:picLocks noChangeAspect="1"/>
+          </p:cNvPicPr>
+          <p:nvPr/>
+        </p:nvPicPr>
+        <p:blipFill>
+          <a:blip r:embed="rId5"/>
+          <a:stretch>
+            <a:fillRect/>
+          </a:stretch>
+        </p:blipFill>
+        <p:spPr>
+          <a:xfrm>
+            <a:off x="94623" y="3601502"/>
+            <a:ext cx="5867400" cy="2400300"/>
+          </a:xfrm>
+          <a:prstGeom prst="rect">
+            <a:avLst/>
+          </a:prstGeom>
+        </p:spPr>
+      </p:pic>
     </p:spTree>
     <p:extLst>
       <p:ext uri="{BB962C8B-B14F-4D97-AF65-F5344CB8AC3E}">
@@ -7764,7 +7486,7 @@
         <p:spPr>
           <a:xfrm>
             <a:off x="914400" y="1938338"/>
-            <a:ext cx="10363200" cy="3852862"/>
+            <a:ext cx="4451846" cy="4299176"/>
           </a:xfrm>
         </p:spPr>
         <p:txBody>
@@ -7776,19 +7498,12 @@
             <a:pPr lvl="1"/>
             <a:r>
               <a:rPr lang="en-US" dirty="0"/>
-              <a:t>Model 2 inputs 15 years worth of data for the same stat lines as model 1.</a:t>
+              <a:t>Model 2 inputs 10 years worth of data for the same stat lines as model 1.</a:t>
             </a:r>
           </a:p>
           <a:p>
             <a:pPr lvl="1"/>
-            <a:r>
-              <a:rPr lang="en-US" dirty="0">
-                <a:solidFill>
-                  <a:srgbClr val="FF0000"/>
-                </a:solidFill>
-              </a:rPr>
-              <a:t>Talking point about predictive model or visuals.</a:t>
-            </a:r>
+            <a:endParaRPr lang="en-US" dirty="0"/>
           </a:p>
           <a:p>
             <a:pPr lvl="1"/>
@@ -7803,43 +7518,70 @@
           </a:p>
           <a:p>
             <a:pPr lvl="1"/>
-            <a:endParaRPr lang="en-US" dirty="0"/>
-          </a:p>
-          <a:p>
-            <a:pPr lvl="1"/>
-            <a:endParaRPr lang="en-US" dirty="0"/>
-          </a:p>
-          <a:p>
-            <a:pPr lvl="1"/>
             <a:r>
               <a:rPr lang="en-US" dirty="0"/>
-              <a:t>(Example snippets of code for easy explanation of methods)</a:t>
+              <a:t>Iterates on initial model for optimization and further exploration</a:t>
             </a:r>
           </a:p>
           <a:p>
             <a:pPr lvl="2"/>
             <a:r>
-              <a:rPr lang="en-US" dirty="0"/>
-              <a:t>E.g. Output of model prediction accuracy.</a:t>
+              <a:rPr lang="en-US" sz="1800" dirty="0"/>
+              <a:t>Random Forest Classifier</a:t>
             </a:r>
           </a:p>
           <a:p>
             <a:pPr lvl="2"/>
-            <a:endParaRPr lang="en-US" dirty="0"/>
-          </a:p>
-          <a:p>
-            <a:pPr lvl="2"/>
-            <a:endParaRPr lang="en-US" dirty="0"/>
-          </a:p>
-          <a:p>
-            <a:pPr lvl="1"/>
-            <a:r>
-              <a:rPr lang="en-US" dirty="0"/>
-              <a:t>(Or include other visual here)</a:t>
-            </a:r>
-          </a:p>
-        </p:txBody>
-      </p:sp>
+            <a:r>
+              <a:rPr lang="en-US" sz="1800" dirty="0"/>
+              <a:t>Hyperparameter tuning using </a:t>
+            </a:r>
+            <a:r>
+              <a:rPr lang="en-US" sz="1800" dirty="0" err="1"/>
+              <a:t>RandomizedSearchCV</a:t>
+            </a:r>
+            <a:r>
+              <a:rPr lang="en-US" sz="1800" dirty="0"/>
+              <a:t> 🤘🏻</a:t>
+            </a:r>
+          </a:p>
+        </p:txBody>
+      </p:sp>
+      <p:pic>
+        <p:nvPicPr>
+          <p:cNvPr id="4" name="Picture 3">
+            <a:extLst>
+              <a:ext uri="{FF2B5EF4-FFF2-40B4-BE49-F238E27FC236}">
+                <a16:creationId xmlns:a16="http://schemas.microsoft.com/office/drawing/2014/main" id="{3B2693D7-737A-C4E6-ADF9-7E07145957ED}"/>
+              </a:ext>
+            </a:extLst>
+          </p:cNvPr>
+          <p:cNvPicPr>
+            <a:picLocks noChangeAspect="1"/>
+          </p:cNvPicPr>
+          <p:nvPr/>
+        </p:nvPicPr>
+        <p:blipFill>
+          <a:blip r:embed="rId3"/>
+          <a:stretch>
+            <a:fillRect/>
+          </a:stretch>
+        </p:blipFill>
+        <p:spPr>
+          <a:xfrm>
+            <a:off x="5713500" y="2467929"/>
+            <a:ext cx="6044704" cy="2652712"/>
+          </a:xfrm>
+          <a:prstGeom prst="rect">
+            <a:avLst/>
+          </a:prstGeom>
+          <a:ln>
+            <a:solidFill>
+              <a:schemeClr val="tx1"/>
+            </a:solidFill>
+          </a:ln>
+        </p:spPr>
+      </p:pic>
     </p:spTree>
     <p:extLst>
       <p:ext uri="{BB962C8B-B14F-4D97-AF65-F5344CB8AC3E}">
@@ -7870,15 +7612,51 @@
           <a:chExt cx="0" cy="0"/>
         </a:xfrm>
       </p:grpSpPr>
-      <p:sp>
-        <p:nvSpPr>
-          <p:cNvPr id="6" name="Title 5">
+      <p:pic>
+        <p:nvPicPr>
+          <p:cNvPr id="4" name="Picture 3">
             <a:extLst>
               <a:ext uri="{FF2B5EF4-FFF2-40B4-BE49-F238E27FC236}">
-                <a16:creationId xmlns:a16="http://schemas.microsoft.com/office/drawing/2014/main" id="{3435514F-098A-5E0B-B259-D04424AF5714}"/>
+                <a16:creationId xmlns:a16="http://schemas.microsoft.com/office/drawing/2014/main" id="{FCFA4B44-65C2-F784-F462-665A94D8E198}"/>
               </a:ext>
             </a:extLst>
           </p:cNvPr>
+          <p:cNvPicPr>
+            <a:picLocks noChangeAspect="1"/>
+          </p:cNvPicPr>
+          <p:nvPr/>
+        </p:nvPicPr>
+        <p:blipFill>
+          <a:blip r:embed="rId3">
+            <a:extLst>
+              <a:ext uri="{28A0092B-C50C-407E-A947-70E740481C1C}">
+                <a14:useLocalDpi xmlns:a14="http://schemas.microsoft.com/office/drawing/2010/main" val="0"/>
+              </a:ext>
+            </a:extLst>
+          </a:blip>
+          <a:stretch>
+            <a:fillRect/>
+          </a:stretch>
+        </p:blipFill>
+        <p:spPr>
+          <a:xfrm>
+            <a:off x="895885" y="548628"/>
+            <a:ext cx="10243476" cy="6146086"/>
+          </a:xfrm>
+          <a:prstGeom prst="rect">
+            <a:avLst/>
+          </a:prstGeom>
+        </p:spPr>
+      </p:pic>
+      <p:sp>
+        <p:nvSpPr>
+          <p:cNvPr id="7" name="Title 6">
+            <a:extLst>
+              <a:ext uri="{FF2B5EF4-FFF2-40B4-BE49-F238E27FC236}">
+                <a16:creationId xmlns:a16="http://schemas.microsoft.com/office/drawing/2014/main" id="{77DDEC4B-4AB3-AD04-C748-45ECD55AABE3}"/>
+              </a:ext>
+            </a:extLst>
+          </p:cNvPr>
           <p:cNvSpPr>
             <a:spLocks noGrp="1"/>
           </p:cNvSpPr>
@@ -7886,7 +7664,12 @@
             <p:ph type="title"/>
           </p:nvPr>
         </p:nvSpPr>
-        <p:spPr/>
+        <p:spPr>
+          <a:xfrm>
+            <a:off x="988423" y="163286"/>
+            <a:ext cx="10058400" cy="816417"/>
+          </a:xfrm>
+        </p:spPr>
         <p:txBody>
           <a:bodyPr>
             <a:normAutofit/>
@@ -7894,105 +7677,8 @@
           <a:lstStyle/>
           <a:p>
             <a:r>
-              <a:rPr lang="en-US" sz="4000" cap="none" dirty="0"/>
-              <a:t>Exploratory </a:t>
-            </a:r>
-            <a:r>
-              <a:rPr lang="en-US" sz="4000" dirty="0"/>
-              <a:t>Modeling</a:t>
-            </a:r>
-            <a:r>
-              <a:rPr lang="en-US" sz="4000" cap="none" dirty="0"/>
-              <a:t>: </a:t>
-            </a:r>
-          </a:p>
-        </p:txBody>
-      </p:sp>
-      <p:sp>
-        <p:nvSpPr>
-          <p:cNvPr id="2" name="Content Placeholder 2">
-            <a:extLst>
-              <a:ext uri="{FF2B5EF4-FFF2-40B4-BE49-F238E27FC236}">
-                <a16:creationId xmlns:a16="http://schemas.microsoft.com/office/drawing/2014/main" id="{90DE78EF-856F-9E9B-48FE-CEEC6D33BF0A}"/>
-              </a:ext>
-            </a:extLst>
-          </p:cNvPr>
-          <p:cNvSpPr>
-            <a:spLocks noGrp="1"/>
-          </p:cNvSpPr>
-          <p:nvPr>
-            <p:ph sz="quarter" idx="13"/>
-          </p:nvPr>
-        </p:nvSpPr>
-        <p:spPr>
-          <a:xfrm>
-            <a:off x="914400" y="1937657"/>
-            <a:ext cx="10363200" cy="3853543"/>
-          </a:xfrm>
-        </p:spPr>
-        <p:txBody>
-          <a:bodyPr anchor="t">
-            <a:normAutofit/>
-          </a:bodyPr>
-          <a:lstStyle/>
-          <a:p>
-            <a:pPr lvl="1"/>
-            <a:r>
               <a:rPr lang="en-US" dirty="0"/>
-              <a:t>Random Forest for weighted categories</a:t>
-            </a:r>
-          </a:p>
-          <a:p>
-            <a:pPr lvl="2"/>
-            <a:r>
-              <a:rPr lang="en-US" dirty="0"/>
-              <a:t>(insert DOE Pareto here)</a:t>
-            </a:r>
-          </a:p>
-          <a:p>
-            <a:pPr marL="384048" lvl="2" indent="0">
-              <a:buNone/>
-            </a:pPr>
-            <a:endParaRPr lang="en-US" dirty="0"/>
-          </a:p>
-          <a:p>
-            <a:pPr lvl="1"/>
-            <a:r>
-              <a:rPr lang="en-US" dirty="0"/>
-              <a:t>Talking point</a:t>
-            </a:r>
-          </a:p>
-          <a:p>
-            <a:pPr lvl="2"/>
-            <a:r>
-              <a:rPr lang="en-US" dirty="0"/>
-              <a:t>(e.g. most significant stats for outputting a correct prediction)</a:t>
-            </a:r>
-          </a:p>
-          <a:p>
-            <a:pPr lvl="1"/>
-            <a:endParaRPr lang="en-US" dirty="0"/>
-          </a:p>
-          <a:p>
-            <a:pPr lvl="1"/>
-            <a:endParaRPr lang="en-US" dirty="0"/>
-          </a:p>
-          <a:p>
-            <a:pPr lvl="1"/>
-            <a:endParaRPr lang="en-US" dirty="0"/>
-          </a:p>
-          <a:p>
-            <a:pPr lvl="1"/>
-            <a:r>
-              <a:rPr lang="en-US" dirty="0"/>
-              <a:t>(Example snippets of code for easy explanation of methods)</a:t>
-            </a:r>
-          </a:p>
-          <a:p>
-            <a:pPr lvl="1"/>
-            <a:r>
-              <a:rPr lang="en-US" dirty="0"/>
-              <a:t>(Or include visual here)</a:t>
+              <a:t>Random Forest for Feature Importance</a:t>
             </a:r>
           </a:p>
         </p:txBody>
@@ -8052,95 +7738,47 @@
           <a:p>
             <a:r>
               <a:rPr lang="en-US" sz="4000" cap="none" dirty="0"/>
-              <a:t>Exploratory </a:t>
-            </a:r>
-            <a:r>
-              <a:rPr lang="en-US" sz="4000" dirty="0"/>
-              <a:t>Modeling Visuals</a:t>
-            </a:r>
-            <a:r>
-              <a:rPr lang="en-US" sz="4000" cap="none" dirty="0"/>
-              <a:t>: </a:t>
-            </a:r>
-          </a:p>
-        </p:txBody>
-      </p:sp>
-      <p:sp>
-        <p:nvSpPr>
-          <p:cNvPr id="2" name="Content Placeholder 2">
+              <a:t>K Means Clustering</a:t>
+            </a:r>
+          </a:p>
+        </p:txBody>
+      </p:sp>
+      <p:pic>
+        <p:nvPicPr>
+          <p:cNvPr id="4" name="Picture 3">
             <a:extLst>
               <a:ext uri="{FF2B5EF4-FFF2-40B4-BE49-F238E27FC236}">
-                <a16:creationId xmlns:a16="http://schemas.microsoft.com/office/drawing/2014/main" id="{90DE78EF-856F-9E9B-48FE-CEEC6D33BF0A}"/>
+                <a16:creationId xmlns:a16="http://schemas.microsoft.com/office/drawing/2014/main" id="{1A23A4B7-3CD9-CDE1-F4A4-D6588D3A2184}"/>
               </a:ext>
             </a:extLst>
           </p:cNvPr>
-          <p:cNvSpPr>
-            <a:spLocks noGrp="1"/>
-          </p:cNvSpPr>
-          <p:nvPr>
-            <p:ph sz="quarter" idx="13"/>
-          </p:nvPr>
-        </p:nvSpPr>
+          <p:cNvPicPr>
+            <a:picLocks noChangeAspect="1"/>
+          </p:cNvPicPr>
+          <p:nvPr/>
+        </p:nvPicPr>
+        <p:blipFill>
+          <a:blip r:embed="rId3">
+            <a:extLst>
+              <a:ext uri="{28A0092B-C50C-407E-A947-70E740481C1C}">
+                <a14:useLocalDpi xmlns:a14="http://schemas.microsoft.com/office/drawing/2010/main" val="0"/>
+              </a:ext>
+            </a:extLst>
+          </a:blip>
+          <a:stretch>
+            <a:fillRect/>
+          </a:stretch>
+        </p:blipFill>
         <p:spPr>
           <a:xfrm>
-            <a:off x="914400" y="1937657"/>
-            <a:ext cx="10363200" cy="3853543"/>
+            <a:off x="1" y="1778000"/>
+            <a:ext cx="12192000" cy="5080000"/>
           </a:xfrm>
+          <a:prstGeom prst="rect">
+            <a:avLst/>
+          </a:prstGeom>
         </p:spPr>
-        <p:txBody>
-          <a:bodyPr anchor="t">
-            <a:normAutofit/>
-          </a:bodyPr>
-          <a:lstStyle/>
-          <a:p>
-            <a:pPr marL="201168" marR="0" lvl="1" indent="0" algn="l" defTabSz="914400" rtl="0" eaLnBrk="1" fontAlgn="auto" latinLnBrk="0" hangingPunct="1">
-              <a:lnSpc>
-                <a:spcPct val="90000"/>
-              </a:lnSpc>
-              <a:spcBef>
-                <a:spcPts val="200"/>
-              </a:spcBef>
-              <a:spcAft>
-                <a:spcPts val="400"/>
-              </a:spcAft>
-              <a:buClr>
-                <a:srgbClr val="1B87FD"/>
-              </a:buClr>
-              <a:buSzTx/>
-              <a:buFont typeface="Calibri" pitchFamily="34" charset="0"/>
-              <a:buNone/>
-              <a:tabLst/>
-              <a:defRPr/>
-            </a:pPr>
-            <a:r>
-              <a:rPr lang="en-US" sz="2800" b="1" dirty="0">
-                <a:solidFill>
-                  <a:srgbClr val="FF0000"/>
-                </a:solidFill>
-                <a:latin typeface="Calibri" panose="020F0502020204030204"/>
-              </a:rPr>
-              <a:t>Bar chart</a:t>
-            </a:r>
-            <a:r>
-              <a:rPr kumimoji="0" lang="en-US" sz="2800" b="1" i="0" u="none" strike="noStrike" kern="1200" cap="none" spc="0" normalizeH="0" baseline="0" noProof="0" dirty="0">
-                <a:ln>
-                  <a:noFill/>
-                </a:ln>
-                <a:solidFill>
-                  <a:srgbClr val="FF0000"/>
-                </a:solidFill>
-                <a:effectLst/>
-                <a:uLnTx/>
-                <a:uFillTx/>
-                <a:latin typeface="Calibri" panose="020F0502020204030204"/>
-                <a:ea typeface="+mn-ea"/>
-                <a:cs typeface="+mn-cs"/>
-              </a:rPr>
-              <a:t>  plots here.</a:t>
-            </a:r>
-          </a:p>
-        </p:txBody>
-      </p:sp>
+      </p:pic>
     </p:spTree>
     <p:extLst>
       <p:ext uri="{BB962C8B-B14F-4D97-AF65-F5344CB8AC3E}">

</xml_diff>

<commit_message>
ERS: Organize repo folders. Moved "CSV DATA" to "DATA" folder, updated .ipynb files where needed. Update README. Update final presentation with latest visuals.
</commit_message>
<xml_diff>
--- a/Presentation.pptx
+++ b/Presentation.pptx
@@ -5471,8 +5471,8 @@
         </p:nvSpPr>
         <p:spPr>
           <a:xfrm>
-            <a:off x="4515853" y="288758"/>
-            <a:ext cx="6216315" cy="5736802"/>
+            <a:off x="226303" y="1790700"/>
+            <a:ext cx="11739393" cy="4488180"/>
           </a:xfrm>
           <a:solidFill>
             <a:schemeClr val="bg1"/>
@@ -5647,7 +5647,7 @@
           <a:p>
             <a:r>
               <a:rPr lang="en-US" sz="4000" cap="none" dirty="0"/>
-              <a:t>Clustering Analysis: Unsupervised ML</a:t>
+              <a:t>High-Level Data Trends</a:t>
             </a:r>
           </a:p>
         </p:txBody>
@@ -5670,7 +5670,7 @@
         </p:nvSpPr>
         <p:spPr>
           <a:xfrm>
-            <a:off x="109430" y="5748288"/>
+            <a:off x="359228" y="1217537"/>
             <a:ext cx="11832772" cy="466939"/>
           </a:xfrm>
         </p:spPr>
@@ -5726,7 +5726,7 @@
         </p:blipFill>
         <p:spPr>
           <a:xfrm>
-            <a:off x="0" y="1293336"/>
+            <a:off x="0" y="2382996"/>
             <a:ext cx="12192000" cy="3839337"/>
           </a:xfrm>
           <a:prstGeom prst="rect">
@@ -5789,7 +5789,7 @@
           <a:p>
             <a:r>
               <a:rPr lang="en-US" dirty="0"/>
-              <a:t>Conclusions Summary</a:t>
+              <a:t>Conclusions Summarized</a:t>
             </a:r>
           </a:p>
         </p:txBody>
@@ -6190,8 +6190,32 @@
                   <a:srgbClr val="C00000"/>
                 </a:solidFill>
               </a:rPr>
-              <a:t>Use Supervised machine learning’s predictive model ability to analyze NFL player data for predicting player position.</a:t>
-            </a:r>
+              <a:t>Use Supervised machine learning’s predictive model ability to analyze NFL player data for predicting player position</a:t>
+            </a:r>
+            <a:r>
+              <a:rPr lang="en-US" dirty="0">
+                <a:solidFill>
+                  <a:srgbClr val="C00000"/>
+                </a:solidFill>
+              </a:rPr>
+              <a:t>:</a:t>
+            </a:r>
+          </a:p>
+          <a:p>
+            <a:pPr lvl="1"/>
+            <a:r>
+              <a:rPr lang="en-US" dirty="0">
+                <a:solidFill>
+                  <a:srgbClr val="C00000"/>
+                </a:solidFill>
+              </a:rPr>
+              <a:t>QB, WR, RB, TE</a:t>
+            </a:r>
+            <a:endParaRPr lang="en-US" cap="none" dirty="0">
+              <a:solidFill>
+                <a:srgbClr val="C00000"/>
+              </a:solidFill>
+            </a:endParaRPr>
           </a:p>
           <a:p>
             <a:endParaRPr lang="en-US" cap="none" dirty="0">
@@ -7252,7 +7276,7 @@
           <a:p>
             <a:r>
               <a:rPr lang="en-US" dirty="0"/>
-              <a:t>Model 1: Predicting player position</a:t>
+              <a:t>Model 1: Predicting Player Position</a:t>
             </a:r>
           </a:p>
         </p:txBody>
@@ -7295,7 +7319,7 @@
             <a:pPr lvl="1"/>
             <a:r>
               <a:rPr lang="en-US" dirty="0"/>
-              <a:t>Set N/As to mean of entire column of that stat line</a:t>
+              <a:t>Set N/As to mean of entire column of that stat line.</a:t>
             </a:r>
           </a:p>
           <a:p>
@@ -7462,7 +7486,23 @@
           <a:p>
             <a:r>
               <a:rPr lang="en-US" sz="4000" cap="none" dirty="0"/>
-              <a:t>Model 2: Increase input data</a:t>
+              <a:t>Model 2: Increase Input </a:t>
+            </a:r>
+            <a:r>
+              <a:rPr lang="en-US" sz="4000" dirty="0"/>
+              <a:t>D</a:t>
+            </a:r>
+            <a:r>
+              <a:rPr lang="en-US" sz="4000" cap="none" dirty="0"/>
+              <a:t>ata, Change </a:t>
+            </a:r>
+            <a:r>
+              <a:rPr lang="en-US" sz="4000" dirty="0"/>
+              <a:t>C</a:t>
+            </a:r>
+            <a:r>
+              <a:rPr lang="en-US" sz="4000" cap="none" dirty="0"/>
+              <a:t>lassifier</a:t>
             </a:r>
           </a:p>
         </p:txBody>
@@ -7509,7 +7549,7 @@
             <a:pPr lvl="1"/>
             <a:r>
               <a:rPr lang="en-US" dirty="0"/>
-              <a:t>Set N/As to median of that position for that week</a:t>
+              <a:t>Set N/As to median of that position for that week.</a:t>
             </a:r>
           </a:p>
           <a:p>
@@ -7520,7 +7560,7 @@
             <a:pPr lvl="1"/>
             <a:r>
               <a:rPr lang="en-US" dirty="0"/>
-              <a:t>Iterates on initial model for optimization and further exploration</a:t>
+              <a:t>Iterates on initial model for optimization and further exploration:</a:t>
             </a:r>
           </a:p>
           <a:p>
@@ -7737,6 +7777,14 @@
           <a:lstStyle/>
           <a:p>
             <a:r>
+              <a:rPr lang="en-US" sz="4000" dirty="0" err="1"/>
+              <a:t>Unsupervized</a:t>
+            </a:r>
+            <a:r>
+              <a:rPr lang="en-US" sz="4000" dirty="0"/>
+              <a:t> </a:t>
+            </a:r>
+            <a:r>
               <a:rPr lang="en-US" sz="4000" cap="none" dirty="0"/>
               <a:t>K Means Clustering</a:t>
             </a:r>
@@ -7745,10 +7793,10 @@
       </p:sp>
       <p:pic>
         <p:nvPicPr>
-          <p:cNvPr id="4" name="Picture 3">
+          <p:cNvPr id="7" name="Picture 6">
             <a:extLst>
               <a:ext uri="{FF2B5EF4-FFF2-40B4-BE49-F238E27FC236}">
-                <a16:creationId xmlns:a16="http://schemas.microsoft.com/office/drawing/2014/main" id="{1A23A4B7-3CD9-CDE1-F4A4-D6588D3A2184}"/>
+                <a16:creationId xmlns:a16="http://schemas.microsoft.com/office/drawing/2014/main" id="{F89F6D38-6B51-7F83-26BE-8F14E7B69F60}"/>
               </a:ext>
             </a:extLst>
           </p:cNvPr>
@@ -7771,7 +7819,7 @@
         </p:blipFill>
         <p:spPr>
           <a:xfrm>
-            <a:off x="1" y="1778000"/>
+            <a:off x="0" y="1778000"/>
             <a:ext cx="12192000" cy="5080000"/>
           </a:xfrm>
           <a:prstGeom prst="rect">

</xml_diff>

<commit_message>
ERS: fix typos in presentation.
</commit_message>
<xml_diff>
--- a/Presentation.pptx
+++ b/Presentation.pptx
@@ -208,7 +208,7 @@
           <a:p>
             <a:fld id="{218C8F45-0D35-4F06-9AC8-C547C595EDF0}" type="datetimeFigureOut">
               <a:rPr lang="en-US" smtClean="0"/>
-              <a:t>9/18/2023</a:t>
+              <a:t>9/19/2023</a:t>
             </a:fld>
             <a:endParaRPr lang="en-US"/>
           </a:p>
@@ -1780,7 +1780,7 @@
           <a:p>
             <a:fld id="{EDD99DFF-4D7C-4671-8EF0-23A72D1484EC}" type="datetimeFigureOut">
               <a:rPr lang="en-US" smtClean="0"/>
-              <a:t>9/18/2023</a:t>
+              <a:t>9/19/2023</a:t>
             </a:fld>
             <a:endParaRPr lang="en-US"/>
           </a:p>
@@ -1988,7 +1988,7 @@
           <a:p>
             <a:fld id="{EDD99DFF-4D7C-4671-8EF0-23A72D1484EC}" type="datetimeFigureOut">
               <a:rPr lang="en-US" smtClean="0"/>
-              <a:t>9/18/2023</a:t>
+              <a:t>9/19/2023</a:t>
             </a:fld>
             <a:endParaRPr lang="en-US"/>
           </a:p>
@@ -2244,7 +2244,7 @@
           <a:p>
             <a:fld id="{EDD99DFF-4D7C-4671-8EF0-23A72D1484EC}" type="datetimeFigureOut">
               <a:rPr lang="en-US" smtClean="0"/>
-              <a:t>9/18/2023</a:t>
+              <a:t>9/19/2023</a:t>
             </a:fld>
             <a:endParaRPr lang="en-US"/>
           </a:p>
@@ -2419,7 +2419,7 @@
           <a:p>
             <a:fld id="{EDD99DFF-4D7C-4671-8EF0-23A72D1484EC}" type="datetimeFigureOut">
               <a:rPr lang="en-US" smtClean="0"/>
-              <a:t>9/18/2023</a:t>
+              <a:t>9/19/2023</a:t>
             </a:fld>
             <a:endParaRPr lang="en-US"/>
           </a:p>
@@ -2589,7 +2589,7 @@
           <a:p>
             <a:fld id="{EDD99DFF-4D7C-4671-8EF0-23A72D1484EC}" type="datetimeFigureOut">
               <a:rPr lang="en-US" smtClean="0"/>
-              <a:t>9/18/2023</a:t>
+              <a:t>9/19/2023</a:t>
             </a:fld>
             <a:endParaRPr lang="en-US"/>
           </a:p>
@@ -2932,7 +2932,7 @@
           <a:p>
             <a:fld id="{EDD99DFF-4D7C-4671-8EF0-23A72D1484EC}" type="datetimeFigureOut">
               <a:rPr lang="en-US" smtClean="0"/>
-              <a:t>9/18/2023</a:t>
+              <a:t>9/19/2023</a:t>
             </a:fld>
             <a:endParaRPr lang="en-US"/>
           </a:p>
@@ -3207,7 +3207,7 @@
           <a:p>
             <a:fld id="{EDD99DFF-4D7C-4671-8EF0-23A72D1484EC}" type="datetimeFigureOut">
               <a:rPr lang="en-US" smtClean="0"/>
-              <a:t>9/18/2023</a:t>
+              <a:t>9/19/2023</a:t>
             </a:fld>
             <a:endParaRPr lang="en-US"/>
           </a:p>
@@ -3586,7 +3586,7 @@
           <a:p>
             <a:fld id="{EDD99DFF-4D7C-4671-8EF0-23A72D1484EC}" type="datetimeFigureOut">
               <a:rPr lang="en-US" smtClean="0"/>
-              <a:t>9/18/2023</a:t>
+              <a:t>9/19/2023</a:t>
             </a:fld>
             <a:endParaRPr lang="en-US"/>
           </a:p>
@@ -3704,7 +3704,7 @@
           <a:p>
             <a:fld id="{EDD99DFF-4D7C-4671-8EF0-23A72D1484EC}" type="datetimeFigureOut">
               <a:rPr lang="en-US" smtClean="0"/>
-              <a:t>9/18/2023</a:t>
+              <a:t>9/19/2023</a:t>
             </a:fld>
             <a:endParaRPr lang="en-US"/>
           </a:p>
@@ -3875,7 +3875,7 @@
           <a:p>
             <a:fld id="{EDD99DFF-4D7C-4671-8EF0-23A72D1484EC}" type="datetimeFigureOut">
               <a:rPr lang="en-US" smtClean="0"/>
-              <a:t>9/18/2023</a:t>
+              <a:t>9/19/2023</a:t>
             </a:fld>
             <a:endParaRPr lang="en-US"/>
           </a:p>
@@ -4229,7 +4229,7 @@
           <a:p>
             <a:fld id="{EDD99DFF-4D7C-4671-8EF0-23A72D1484EC}" type="datetimeFigureOut">
               <a:rPr lang="en-US" smtClean="0"/>
-              <a:t>9/18/2023</a:t>
+              <a:t>9/19/2023</a:t>
             </a:fld>
             <a:endParaRPr lang="en-US"/>
           </a:p>
@@ -4606,7 +4606,7 @@
           <a:p>
             <a:fld id="{EDD99DFF-4D7C-4671-8EF0-23A72D1484EC}" type="datetimeFigureOut">
               <a:rPr lang="en-US" smtClean="0"/>
-              <a:t>9/18/2023</a:t>
+              <a:t>9/19/2023</a:t>
             </a:fld>
             <a:endParaRPr lang="en-US"/>
           </a:p>
@@ -4893,7 +4893,7 @@
           <a:p>
             <a:fld id="{EDD99DFF-4D7C-4671-8EF0-23A72D1484EC}" type="datetimeFigureOut">
               <a:rPr lang="en-US" smtClean="0"/>
-              <a:t>9/18/2023</a:t>
+              <a:t>9/19/2023</a:t>
             </a:fld>
             <a:endParaRPr lang="en-US"/>
           </a:p>
@@ -6077,7 +6077,7 @@
           <a:p>
             <a:r>
               <a:rPr lang="en-US" cap="none" dirty="0"/>
-              <a:t>Kyle Murphy, Timothy Salazar, Travis, Steinkopf, Evan Sprecher</a:t>
+              <a:t>Kyle Murphy, Timothy Salazar, Travis Steinkopf, Evan Sprecher</a:t>
             </a:r>
           </a:p>
         </p:txBody>
@@ -6190,7 +6190,7 @@
                   <a:srgbClr val="C00000"/>
                 </a:solidFill>
               </a:rPr>
-              <a:t>Use Supervised machine learning’s predictive model ability to analyze NFL player data for predicting player position</a:t>
+              <a:t>Use machine learning’s supervised predictive model ability to analyze NFL player data for predicting player position</a:t>
             </a:r>
             <a:r>
               <a:rPr lang="en-US" dirty="0">

</xml_diff>